<commit_message>
splitlogo-stoplogo.pptx: white backgrounds for the suggested logos
</commit_message>
<xml_diff>
--- a/img/splitlogo-stoplogo.pptx
+++ b/img/splitlogo-stoplogo.pptx
@@ -261,7 +261,7 @@
           <a:p>
             <a:fld id="{A55FD0B7-5133-41F2-9B42-5C12CB2C7370}" type="datetimeFigureOut">
               <a:rPr lang="de-DE" smtClean="0"/>
-              <a:t>14.03.2022</a:t>
+              <a:t>11.04.2022</a:t>
             </a:fld>
             <a:endParaRPr lang="de-DE"/>
           </a:p>
@@ -461,7 +461,7 @@
           <a:p>
             <a:fld id="{A55FD0B7-5133-41F2-9B42-5C12CB2C7370}" type="datetimeFigureOut">
               <a:rPr lang="de-DE" smtClean="0"/>
-              <a:t>14.03.2022</a:t>
+              <a:t>11.04.2022</a:t>
             </a:fld>
             <a:endParaRPr lang="de-DE"/>
           </a:p>
@@ -671,7 +671,7 @@
           <a:p>
             <a:fld id="{A55FD0B7-5133-41F2-9B42-5C12CB2C7370}" type="datetimeFigureOut">
               <a:rPr lang="de-DE" smtClean="0"/>
-              <a:t>14.03.2022</a:t>
+              <a:t>11.04.2022</a:t>
             </a:fld>
             <a:endParaRPr lang="de-DE"/>
           </a:p>
@@ -871,7 +871,7 @@
           <a:p>
             <a:fld id="{A55FD0B7-5133-41F2-9B42-5C12CB2C7370}" type="datetimeFigureOut">
               <a:rPr lang="de-DE" smtClean="0"/>
-              <a:t>14.03.2022</a:t>
+              <a:t>11.04.2022</a:t>
             </a:fld>
             <a:endParaRPr lang="de-DE"/>
           </a:p>
@@ -1147,7 +1147,7 @@
           <a:p>
             <a:fld id="{A55FD0B7-5133-41F2-9B42-5C12CB2C7370}" type="datetimeFigureOut">
               <a:rPr lang="de-DE" smtClean="0"/>
-              <a:t>14.03.2022</a:t>
+              <a:t>11.04.2022</a:t>
             </a:fld>
             <a:endParaRPr lang="de-DE"/>
           </a:p>
@@ -1415,7 +1415,7 @@
           <a:p>
             <a:fld id="{A55FD0B7-5133-41F2-9B42-5C12CB2C7370}" type="datetimeFigureOut">
               <a:rPr lang="de-DE" smtClean="0"/>
-              <a:t>14.03.2022</a:t>
+              <a:t>11.04.2022</a:t>
             </a:fld>
             <a:endParaRPr lang="de-DE"/>
           </a:p>
@@ -1830,7 +1830,7 @@
           <a:p>
             <a:fld id="{A55FD0B7-5133-41F2-9B42-5C12CB2C7370}" type="datetimeFigureOut">
               <a:rPr lang="de-DE" smtClean="0"/>
-              <a:t>14.03.2022</a:t>
+              <a:t>11.04.2022</a:t>
             </a:fld>
             <a:endParaRPr lang="de-DE"/>
           </a:p>
@@ -1972,7 +1972,7 @@
           <a:p>
             <a:fld id="{A55FD0B7-5133-41F2-9B42-5C12CB2C7370}" type="datetimeFigureOut">
               <a:rPr lang="de-DE" smtClean="0"/>
-              <a:t>14.03.2022</a:t>
+              <a:t>11.04.2022</a:t>
             </a:fld>
             <a:endParaRPr lang="de-DE"/>
           </a:p>
@@ -2085,7 +2085,7 @@
           <a:p>
             <a:fld id="{A55FD0B7-5133-41F2-9B42-5C12CB2C7370}" type="datetimeFigureOut">
               <a:rPr lang="de-DE" smtClean="0"/>
-              <a:t>14.03.2022</a:t>
+              <a:t>11.04.2022</a:t>
             </a:fld>
             <a:endParaRPr lang="de-DE"/>
           </a:p>
@@ -2398,7 +2398,7 @@
           <a:p>
             <a:fld id="{A55FD0B7-5133-41F2-9B42-5C12CB2C7370}" type="datetimeFigureOut">
               <a:rPr lang="de-DE" smtClean="0"/>
-              <a:t>14.03.2022</a:t>
+              <a:t>11.04.2022</a:t>
             </a:fld>
             <a:endParaRPr lang="de-DE"/>
           </a:p>
@@ -2687,7 +2687,7 @@
           <a:p>
             <a:fld id="{A55FD0B7-5133-41F2-9B42-5C12CB2C7370}" type="datetimeFigureOut">
               <a:rPr lang="de-DE" smtClean="0"/>
-              <a:t>14.03.2022</a:t>
+              <a:t>11.04.2022</a:t>
             </a:fld>
             <a:endParaRPr lang="de-DE"/>
           </a:p>
@@ -2930,7 +2930,7 @@
           <a:p>
             <a:fld id="{A55FD0B7-5133-41F2-9B42-5C12CB2C7370}" type="datetimeFigureOut">
               <a:rPr lang="de-DE" smtClean="0"/>
-              <a:t>14.03.2022</a:t>
+              <a:t>11.04.2022</a:t>
             </a:fld>
             <a:endParaRPr lang="de-DE"/>
           </a:p>
@@ -3776,7 +3776,7 @@
               <a:t>for</a:t>
             </a:r>
             <a:r>
-              <a:rPr lang="de-DE"/>
+              <a:rPr lang="de-DE" dirty="0"/>
               <a:t> a </a:t>
             </a:r>
             <a:r>
@@ -3880,201 +3880,6 @@
           </a:p>
         </p:txBody>
       </p:sp>
-      <p:pic>
-        <p:nvPicPr>
-          <p:cNvPr id="6" name="Graphic 5" descr="Questions">
-            <a:extLst>
-              <a:ext uri="{FF2B5EF4-FFF2-40B4-BE49-F238E27FC236}">
-                <a16:creationId xmlns:a16="http://schemas.microsoft.com/office/drawing/2014/main" id="{337FF2DF-9438-4572-943C-2798E11539F4}"/>
-              </a:ext>
-            </a:extLst>
-          </p:cNvPr>
-          <p:cNvPicPr>
-            <a:picLocks noChangeAspect="1"/>
-          </p:cNvPicPr>
-          <p:nvPr/>
-        </p:nvPicPr>
-        <p:blipFill>
-          <a:blip r:embed="rId2">
-            <a:extLst>
-              <a:ext uri="{28A0092B-C50C-407E-A947-70E740481C1C}">
-                <a14:useLocalDpi xmlns:a14="http://schemas.microsoft.com/office/drawing/2010/main" val="0"/>
-              </a:ext>
-              <a:ext uri="{96DAC541-7B7A-43D3-8B79-37D633B846F1}">
-                <asvg:svgBlip xmlns:asvg="http://schemas.microsoft.com/office/drawing/2016/SVG/main" r:embed="rId3"/>
-              </a:ext>
-            </a:extLst>
-          </a:blip>
-          <a:stretch>
-            <a:fillRect/>
-          </a:stretch>
-        </p:blipFill>
-        <p:spPr>
-          <a:xfrm>
-            <a:off x="9402618" y="1609845"/>
-            <a:ext cx="914400" cy="914400"/>
-          </a:xfrm>
-          <a:prstGeom prst="rect">
-            <a:avLst/>
-          </a:prstGeom>
-        </p:spPr>
-      </p:pic>
-      <p:pic>
-        <p:nvPicPr>
-          <p:cNvPr id="7" name="Graphic 6" descr="Clapper board">
-            <a:extLst>
-              <a:ext uri="{FF2B5EF4-FFF2-40B4-BE49-F238E27FC236}">
-                <a16:creationId xmlns:a16="http://schemas.microsoft.com/office/drawing/2014/main" id="{C3CD344C-6106-4EC4-97D7-8F2F2C681246}"/>
-              </a:ext>
-            </a:extLst>
-          </p:cNvPr>
-          <p:cNvPicPr>
-            <a:picLocks noChangeAspect="1"/>
-          </p:cNvPicPr>
-          <p:nvPr/>
-        </p:nvPicPr>
-        <p:blipFill>
-          <a:blip r:embed="rId4">
-            <a:extLst>
-              <a:ext uri="{28A0092B-C50C-407E-A947-70E740481C1C}">
-                <a14:useLocalDpi xmlns:a14="http://schemas.microsoft.com/office/drawing/2010/main" val="0"/>
-              </a:ext>
-              <a:ext uri="{96DAC541-7B7A-43D3-8B79-37D633B846F1}">
-                <asvg:svgBlip xmlns:asvg="http://schemas.microsoft.com/office/drawing/2016/SVG/main" r:embed="rId5"/>
-              </a:ext>
-            </a:extLst>
-          </a:blip>
-          <a:stretch>
-            <a:fillRect/>
-          </a:stretch>
-        </p:blipFill>
-        <p:spPr>
-          <a:xfrm>
-            <a:off x="11277600" y="6035675"/>
-            <a:ext cx="914400" cy="914400"/>
-          </a:xfrm>
-          <a:prstGeom prst="rect">
-            <a:avLst/>
-          </a:prstGeom>
-        </p:spPr>
-      </p:pic>
-      <p:pic>
-        <p:nvPicPr>
-          <p:cNvPr id="12" name="Graphic 11" descr="Questions">
-            <a:extLst>
-              <a:ext uri="{FF2B5EF4-FFF2-40B4-BE49-F238E27FC236}">
-                <a16:creationId xmlns:a16="http://schemas.microsoft.com/office/drawing/2014/main" id="{0270CE08-DD03-46CA-A494-1DB05F3136C1}"/>
-              </a:ext>
-            </a:extLst>
-          </p:cNvPr>
-          <p:cNvPicPr>
-            <a:picLocks noChangeAspect="1"/>
-          </p:cNvPicPr>
-          <p:nvPr/>
-        </p:nvPicPr>
-        <p:blipFill>
-          <a:blip r:embed="rId2">
-            <a:extLst>
-              <a:ext uri="{28A0092B-C50C-407E-A947-70E740481C1C}">
-                <a14:useLocalDpi xmlns:a14="http://schemas.microsoft.com/office/drawing/2010/main" val="0"/>
-              </a:ext>
-              <a:ext uri="{96DAC541-7B7A-43D3-8B79-37D633B846F1}">
-                <asvg:svgBlip xmlns:asvg="http://schemas.microsoft.com/office/drawing/2016/SVG/main" r:embed="rId3"/>
-              </a:ext>
-            </a:extLst>
-          </a:blip>
-          <a:stretch>
-            <a:fillRect/>
-          </a:stretch>
-        </p:blipFill>
-        <p:spPr>
-          <a:xfrm>
-            <a:off x="-76200" y="6000750"/>
-            <a:ext cx="914400" cy="914400"/>
-          </a:xfrm>
-          <a:prstGeom prst="rect">
-            <a:avLst/>
-          </a:prstGeom>
-        </p:spPr>
-      </p:pic>
-      <p:pic>
-        <p:nvPicPr>
-          <p:cNvPr id="13" name="Graphic 12" descr="Questions">
-            <a:extLst>
-              <a:ext uri="{FF2B5EF4-FFF2-40B4-BE49-F238E27FC236}">
-                <a16:creationId xmlns:a16="http://schemas.microsoft.com/office/drawing/2014/main" id="{1924270F-0312-4702-9263-44E75922CC60}"/>
-              </a:ext>
-            </a:extLst>
-          </p:cNvPr>
-          <p:cNvPicPr>
-            <a:picLocks noChangeAspect="1"/>
-          </p:cNvPicPr>
-          <p:nvPr/>
-        </p:nvPicPr>
-        <p:blipFill>
-          <a:blip r:embed="rId2">
-            <a:extLst>
-              <a:ext uri="{28A0092B-C50C-407E-A947-70E740481C1C}">
-                <a14:useLocalDpi xmlns:a14="http://schemas.microsoft.com/office/drawing/2010/main" val="0"/>
-              </a:ext>
-              <a:ext uri="{96DAC541-7B7A-43D3-8B79-37D633B846F1}">
-                <asvg:svgBlip xmlns:asvg="http://schemas.microsoft.com/office/drawing/2016/SVG/main" r:embed="rId3"/>
-              </a:ext>
-            </a:extLst>
-          </a:blip>
-          <a:stretch>
-            <a:fillRect/>
-          </a:stretch>
-        </p:blipFill>
-        <p:spPr>
-          <a:xfrm>
-            <a:off x="-62340" y="-53694"/>
-            <a:ext cx="914400" cy="914400"/>
-          </a:xfrm>
-          <a:prstGeom prst="rect">
-            <a:avLst/>
-          </a:prstGeom>
-        </p:spPr>
-      </p:pic>
-      <p:pic>
-        <p:nvPicPr>
-          <p:cNvPr id="14" name="Graphic 13" descr="Questions">
-            <a:extLst>
-              <a:ext uri="{FF2B5EF4-FFF2-40B4-BE49-F238E27FC236}">
-                <a16:creationId xmlns:a16="http://schemas.microsoft.com/office/drawing/2014/main" id="{B0AF46E4-6601-4479-87BB-EF1F2ED12602}"/>
-              </a:ext>
-            </a:extLst>
-          </p:cNvPr>
-          <p:cNvPicPr>
-            <a:picLocks noChangeAspect="1"/>
-          </p:cNvPicPr>
-          <p:nvPr/>
-        </p:nvPicPr>
-        <p:blipFill>
-          <a:blip r:embed="rId2">
-            <a:extLst>
-              <a:ext uri="{28A0092B-C50C-407E-A947-70E740481C1C}">
-                <a14:useLocalDpi xmlns:a14="http://schemas.microsoft.com/office/drawing/2010/main" val="0"/>
-              </a:ext>
-              <a:ext uri="{96DAC541-7B7A-43D3-8B79-37D633B846F1}">
-                <asvg:svgBlip xmlns:asvg="http://schemas.microsoft.com/office/drawing/2016/SVG/main" r:embed="rId3"/>
-              </a:ext>
-            </a:extLst>
-          </a:blip>
-          <a:stretch>
-            <a:fillRect/>
-          </a:stretch>
-        </p:blipFill>
-        <p:spPr>
-          <a:xfrm>
-            <a:off x="11363072" y="-44460"/>
-            <a:ext cx="914400" cy="914400"/>
-          </a:xfrm>
-          <a:prstGeom prst="rect">
-            <a:avLst/>
-          </a:prstGeom>
-        </p:spPr>
-      </p:pic>
       <p:sp>
         <p:nvSpPr>
           <p:cNvPr id="2" name="TextBox 1">
@@ -4253,10 +4058,10 @@
       </p:sp>
       <p:pic>
         <p:nvPicPr>
-          <p:cNvPr id="18" name="Graphic 17" descr="Clapper board">
-            <a:extLst>
-              <a:ext uri="{FF2B5EF4-FFF2-40B4-BE49-F238E27FC236}">
-                <a16:creationId xmlns:a16="http://schemas.microsoft.com/office/drawing/2014/main" id="{96F2396B-1866-44C5-9C9D-ABC392CBC49A}"/>
+          <p:cNvPr id="4" name="Picture 3">
+            <a:extLst>
+              <a:ext uri="{FF2B5EF4-FFF2-40B4-BE49-F238E27FC236}">
+                <a16:creationId xmlns:a16="http://schemas.microsoft.com/office/drawing/2014/main" id="{26A50F1C-DFE1-48DC-9B06-A36DCD6CE173}"/>
               </a:ext>
             </a:extLst>
           </p:cNvPr>
@@ -4266,46 +4071,7 @@
           <p:nvPr/>
         </p:nvPicPr>
         <p:blipFill>
-          <a:blip r:embed="rId4">
-            <a:extLst>
-              <a:ext uri="{28A0092B-C50C-407E-A947-70E740481C1C}">
-                <a14:useLocalDpi xmlns:a14="http://schemas.microsoft.com/office/drawing/2010/main" val="0"/>
-              </a:ext>
-              <a:ext uri="{96DAC541-7B7A-43D3-8B79-37D633B846F1}">
-                <asvg:svgBlip xmlns:asvg="http://schemas.microsoft.com/office/drawing/2016/SVG/main" r:embed="rId5"/>
-              </a:ext>
-            </a:extLst>
-          </a:blip>
-          <a:stretch>
-            <a:fillRect/>
-          </a:stretch>
-        </p:blipFill>
-        <p:spPr>
-          <a:xfrm>
-            <a:off x="4206009" y="1526450"/>
-            <a:ext cx="914400" cy="914400"/>
-          </a:xfrm>
-          <a:prstGeom prst="rect">
-            <a:avLst/>
-          </a:prstGeom>
-        </p:spPr>
-      </p:pic>
-      <p:pic>
-        <p:nvPicPr>
-          <p:cNvPr id="4" name="Picture 3">
-            <a:extLst>
-              <a:ext uri="{FF2B5EF4-FFF2-40B4-BE49-F238E27FC236}">
-                <a16:creationId xmlns:a16="http://schemas.microsoft.com/office/drawing/2014/main" id="{26A50F1C-DFE1-48DC-9B06-A36DCD6CE173}"/>
-              </a:ext>
-            </a:extLst>
-          </p:cNvPr>
-          <p:cNvPicPr>
-            <a:picLocks noChangeAspect="1"/>
-          </p:cNvPicPr>
-          <p:nvPr/>
-        </p:nvPicPr>
-        <p:blipFill>
-          <a:blip r:embed="rId6">
+          <a:blip r:embed="rId2">
             <a:extLst>
               <a:ext uri="{28A0092B-C50C-407E-A947-70E740481C1C}">
                 <a14:useLocalDpi xmlns:a14="http://schemas.microsoft.com/office/drawing/2010/main" val="0"/>
@@ -4326,6 +4092,694 @@
           </a:prstGeom>
         </p:spPr>
       </p:pic>
+      <p:grpSp>
+        <p:nvGrpSpPr>
+          <p:cNvPr id="8" name="Group 7">
+            <a:extLst>
+              <a:ext uri="{FF2B5EF4-FFF2-40B4-BE49-F238E27FC236}">
+                <a16:creationId xmlns:a16="http://schemas.microsoft.com/office/drawing/2014/main" id="{91291BA3-142C-4B93-BD7A-3380A018ACF4}"/>
+              </a:ext>
+            </a:extLst>
+          </p:cNvPr>
+          <p:cNvGrpSpPr/>
+          <p:nvPr/>
+        </p:nvGrpSpPr>
+        <p:grpSpPr>
+          <a:xfrm>
+            <a:off x="9389351" y="1596423"/>
+            <a:ext cx="914400" cy="914400"/>
+            <a:chOff x="9389351" y="1596423"/>
+            <a:chExt cx="914400" cy="914400"/>
+          </a:xfrm>
+        </p:grpSpPr>
+        <p:sp>
+          <p:nvSpPr>
+            <p:cNvPr id="3" name="Rectangle 2">
+              <a:extLst>
+                <a:ext uri="{FF2B5EF4-FFF2-40B4-BE49-F238E27FC236}">
+                  <a16:creationId xmlns:a16="http://schemas.microsoft.com/office/drawing/2014/main" id="{325C14F6-2387-490B-A2A7-8C6CE103F201}"/>
+                </a:ext>
+              </a:extLst>
+            </p:cNvPr>
+            <p:cNvSpPr>
+              <a:spLocks/>
+            </p:cNvSpPr>
+            <p:nvPr/>
+          </p:nvSpPr>
+          <p:spPr>
+            <a:xfrm>
+              <a:off x="9486554" y="1660411"/>
+              <a:ext cx="720000" cy="792000"/>
+            </a:xfrm>
+            <a:prstGeom prst="rect">
+              <a:avLst/>
+            </a:prstGeom>
+            <a:solidFill>
+              <a:schemeClr val="bg1"/>
+            </a:solidFill>
+            <a:ln>
+              <a:solidFill>
+                <a:schemeClr val="bg1"/>
+              </a:solidFill>
+            </a:ln>
+          </p:spPr>
+          <p:style>
+            <a:lnRef idx="2">
+              <a:schemeClr val="accent1">
+                <a:shade val="50000"/>
+              </a:schemeClr>
+            </a:lnRef>
+            <a:fillRef idx="1">
+              <a:schemeClr val="accent1"/>
+            </a:fillRef>
+            <a:effectRef idx="0">
+              <a:schemeClr val="accent1"/>
+            </a:effectRef>
+            <a:fontRef idx="minor">
+              <a:schemeClr val="lt1"/>
+            </a:fontRef>
+          </p:style>
+          <p:txBody>
+            <a:bodyPr rtlCol="0" anchor="ctr"/>
+            <a:lstStyle/>
+            <a:p>
+              <a:pPr algn="ctr"/>
+              <a:endParaRPr lang="en-US"/>
+            </a:p>
+          </p:txBody>
+        </p:sp>
+        <p:pic>
+          <p:nvPicPr>
+            <p:cNvPr id="19" name="Graphic 18" descr="Questions">
+              <a:extLst>
+                <a:ext uri="{FF2B5EF4-FFF2-40B4-BE49-F238E27FC236}">
+                  <a16:creationId xmlns:a16="http://schemas.microsoft.com/office/drawing/2014/main" id="{F807AD0C-43ED-466F-91DD-30B51005F393}"/>
+                </a:ext>
+              </a:extLst>
+            </p:cNvPr>
+            <p:cNvPicPr>
+              <a:picLocks noChangeAspect="1"/>
+            </p:cNvPicPr>
+            <p:nvPr/>
+          </p:nvPicPr>
+          <p:blipFill>
+            <a:blip r:embed="rId3">
+              <a:extLst>
+                <a:ext uri="{28A0092B-C50C-407E-A947-70E740481C1C}">
+                  <a14:useLocalDpi xmlns:a14="http://schemas.microsoft.com/office/drawing/2010/main" val="0"/>
+                </a:ext>
+                <a:ext uri="{96DAC541-7B7A-43D3-8B79-37D633B846F1}">
+                  <asvg:svgBlip xmlns:asvg="http://schemas.microsoft.com/office/drawing/2016/SVG/main" r:embed="rId4"/>
+                </a:ext>
+              </a:extLst>
+            </a:blip>
+            <a:stretch>
+              <a:fillRect/>
+            </a:stretch>
+          </p:blipFill>
+          <p:spPr>
+            <a:xfrm>
+              <a:off x="9389351" y="1596423"/>
+              <a:ext cx="914400" cy="914400"/>
+            </a:xfrm>
+            <a:prstGeom prst="rect">
+              <a:avLst/>
+            </a:prstGeom>
+          </p:spPr>
+        </p:pic>
+      </p:grpSp>
+      <p:grpSp>
+        <p:nvGrpSpPr>
+          <p:cNvPr id="20" name="Group 19">
+            <a:extLst>
+              <a:ext uri="{FF2B5EF4-FFF2-40B4-BE49-F238E27FC236}">
+                <a16:creationId xmlns:a16="http://schemas.microsoft.com/office/drawing/2014/main" id="{74A5F4DD-DDC4-4F82-806A-235DDA42D3A8}"/>
+              </a:ext>
+            </a:extLst>
+          </p:cNvPr>
+          <p:cNvGrpSpPr/>
+          <p:nvPr/>
+        </p:nvGrpSpPr>
+        <p:grpSpPr>
+          <a:xfrm>
+            <a:off x="-43794" y="5979345"/>
+            <a:ext cx="914400" cy="914400"/>
+            <a:chOff x="9389351" y="1596423"/>
+            <a:chExt cx="914400" cy="914400"/>
+          </a:xfrm>
+        </p:grpSpPr>
+        <p:sp>
+          <p:nvSpPr>
+            <p:cNvPr id="21" name="Rectangle 20">
+              <a:extLst>
+                <a:ext uri="{FF2B5EF4-FFF2-40B4-BE49-F238E27FC236}">
+                  <a16:creationId xmlns:a16="http://schemas.microsoft.com/office/drawing/2014/main" id="{967D3ABC-C025-4222-B62E-B024F3002E1D}"/>
+                </a:ext>
+              </a:extLst>
+            </p:cNvPr>
+            <p:cNvSpPr>
+              <a:spLocks/>
+            </p:cNvSpPr>
+            <p:nvPr/>
+          </p:nvSpPr>
+          <p:spPr>
+            <a:xfrm>
+              <a:off x="9486554" y="1660411"/>
+              <a:ext cx="720000" cy="792000"/>
+            </a:xfrm>
+            <a:prstGeom prst="rect">
+              <a:avLst/>
+            </a:prstGeom>
+            <a:solidFill>
+              <a:schemeClr val="bg1"/>
+            </a:solidFill>
+            <a:ln>
+              <a:solidFill>
+                <a:schemeClr val="bg1"/>
+              </a:solidFill>
+            </a:ln>
+          </p:spPr>
+          <p:style>
+            <a:lnRef idx="2">
+              <a:schemeClr val="accent1">
+                <a:shade val="50000"/>
+              </a:schemeClr>
+            </a:lnRef>
+            <a:fillRef idx="1">
+              <a:schemeClr val="accent1"/>
+            </a:fillRef>
+            <a:effectRef idx="0">
+              <a:schemeClr val="accent1"/>
+            </a:effectRef>
+            <a:fontRef idx="minor">
+              <a:schemeClr val="lt1"/>
+            </a:fontRef>
+          </p:style>
+          <p:txBody>
+            <a:bodyPr rtlCol="0" anchor="ctr"/>
+            <a:lstStyle/>
+            <a:p>
+              <a:pPr algn="ctr"/>
+              <a:endParaRPr lang="en-US"/>
+            </a:p>
+          </p:txBody>
+        </p:sp>
+        <p:pic>
+          <p:nvPicPr>
+            <p:cNvPr id="22" name="Graphic 21" descr="Questions">
+              <a:extLst>
+                <a:ext uri="{FF2B5EF4-FFF2-40B4-BE49-F238E27FC236}">
+                  <a16:creationId xmlns:a16="http://schemas.microsoft.com/office/drawing/2014/main" id="{026F4367-F528-4ED9-A529-E2D79D232D64}"/>
+                </a:ext>
+              </a:extLst>
+            </p:cNvPr>
+            <p:cNvPicPr>
+              <a:picLocks noChangeAspect="1"/>
+            </p:cNvPicPr>
+            <p:nvPr/>
+          </p:nvPicPr>
+          <p:blipFill>
+            <a:blip r:embed="rId3">
+              <a:extLst>
+                <a:ext uri="{28A0092B-C50C-407E-A947-70E740481C1C}">
+                  <a14:useLocalDpi xmlns:a14="http://schemas.microsoft.com/office/drawing/2010/main" val="0"/>
+                </a:ext>
+                <a:ext uri="{96DAC541-7B7A-43D3-8B79-37D633B846F1}">
+                  <asvg:svgBlip xmlns:asvg="http://schemas.microsoft.com/office/drawing/2016/SVG/main" r:embed="rId4"/>
+                </a:ext>
+              </a:extLst>
+            </a:blip>
+            <a:stretch>
+              <a:fillRect/>
+            </a:stretch>
+          </p:blipFill>
+          <p:spPr>
+            <a:xfrm>
+              <a:off x="9389351" y="1596423"/>
+              <a:ext cx="914400" cy="914400"/>
+            </a:xfrm>
+            <a:prstGeom prst="rect">
+              <a:avLst/>
+            </a:prstGeom>
+          </p:spPr>
+        </p:pic>
+      </p:grpSp>
+      <p:grpSp>
+        <p:nvGrpSpPr>
+          <p:cNvPr id="23" name="Group 22">
+            <a:extLst>
+              <a:ext uri="{FF2B5EF4-FFF2-40B4-BE49-F238E27FC236}">
+                <a16:creationId xmlns:a16="http://schemas.microsoft.com/office/drawing/2014/main" id="{3D28EC52-53EA-44E7-97EB-17F1A3A0EA58}"/>
+              </a:ext>
+            </a:extLst>
+          </p:cNvPr>
+          <p:cNvGrpSpPr/>
+          <p:nvPr/>
+        </p:nvGrpSpPr>
+        <p:grpSpPr>
+          <a:xfrm>
+            <a:off x="-76200" y="-58412"/>
+            <a:ext cx="914400" cy="914400"/>
+            <a:chOff x="9389351" y="1596423"/>
+            <a:chExt cx="914400" cy="914400"/>
+          </a:xfrm>
+        </p:grpSpPr>
+        <p:sp>
+          <p:nvSpPr>
+            <p:cNvPr id="24" name="Rectangle 23">
+              <a:extLst>
+                <a:ext uri="{FF2B5EF4-FFF2-40B4-BE49-F238E27FC236}">
+                  <a16:creationId xmlns:a16="http://schemas.microsoft.com/office/drawing/2014/main" id="{3B2387EA-7009-4BF2-83AC-C6956F7D2D19}"/>
+                </a:ext>
+              </a:extLst>
+            </p:cNvPr>
+            <p:cNvSpPr>
+              <a:spLocks/>
+            </p:cNvSpPr>
+            <p:nvPr/>
+          </p:nvSpPr>
+          <p:spPr>
+            <a:xfrm>
+              <a:off x="9486554" y="1660411"/>
+              <a:ext cx="720000" cy="792000"/>
+            </a:xfrm>
+            <a:prstGeom prst="rect">
+              <a:avLst/>
+            </a:prstGeom>
+            <a:solidFill>
+              <a:schemeClr val="bg1"/>
+            </a:solidFill>
+            <a:ln>
+              <a:solidFill>
+                <a:schemeClr val="bg1"/>
+              </a:solidFill>
+            </a:ln>
+          </p:spPr>
+          <p:style>
+            <a:lnRef idx="2">
+              <a:schemeClr val="accent1">
+                <a:shade val="50000"/>
+              </a:schemeClr>
+            </a:lnRef>
+            <a:fillRef idx="1">
+              <a:schemeClr val="accent1"/>
+            </a:fillRef>
+            <a:effectRef idx="0">
+              <a:schemeClr val="accent1"/>
+            </a:effectRef>
+            <a:fontRef idx="minor">
+              <a:schemeClr val="lt1"/>
+            </a:fontRef>
+          </p:style>
+          <p:txBody>
+            <a:bodyPr rtlCol="0" anchor="ctr"/>
+            <a:lstStyle/>
+            <a:p>
+              <a:pPr algn="ctr"/>
+              <a:endParaRPr lang="en-US"/>
+            </a:p>
+          </p:txBody>
+        </p:sp>
+        <p:pic>
+          <p:nvPicPr>
+            <p:cNvPr id="25" name="Graphic 24" descr="Questions">
+              <a:extLst>
+                <a:ext uri="{FF2B5EF4-FFF2-40B4-BE49-F238E27FC236}">
+                  <a16:creationId xmlns:a16="http://schemas.microsoft.com/office/drawing/2014/main" id="{781BB852-D6AA-4B8F-AC92-392610AF89CD}"/>
+                </a:ext>
+              </a:extLst>
+            </p:cNvPr>
+            <p:cNvPicPr>
+              <a:picLocks noChangeAspect="1"/>
+            </p:cNvPicPr>
+            <p:nvPr/>
+          </p:nvPicPr>
+          <p:blipFill>
+            <a:blip r:embed="rId3">
+              <a:extLst>
+                <a:ext uri="{28A0092B-C50C-407E-A947-70E740481C1C}">
+                  <a14:useLocalDpi xmlns:a14="http://schemas.microsoft.com/office/drawing/2010/main" val="0"/>
+                </a:ext>
+                <a:ext uri="{96DAC541-7B7A-43D3-8B79-37D633B846F1}">
+                  <asvg:svgBlip xmlns:asvg="http://schemas.microsoft.com/office/drawing/2016/SVG/main" r:embed="rId4"/>
+                </a:ext>
+              </a:extLst>
+            </a:blip>
+            <a:stretch>
+              <a:fillRect/>
+            </a:stretch>
+          </p:blipFill>
+          <p:spPr>
+            <a:xfrm>
+              <a:off x="9389351" y="1596423"/>
+              <a:ext cx="914400" cy="914400"/>
+            </a:xfrm>
+            <a:prstGeom prst="rect">
+              <a:avLst/>
+            </a:prstGeom>
+          </p:spPr>
+        </p:pic>
+      </p:grpSp>
+      <p:grpSp>
+        <p:nvGrpSpPr>
+          <p:cNvPr id="26" name="Group 25">
+            <a:extLst>
+              <a:ext uri="{FF2B5EF4-FFF2-40B4-BE49-F238E27FC236}">
+                <a16:creationId xmlns:a16="http://schemas.microsoft.com/office/drawing/2014/main" id="{F8897FF7-54C7-4C9E-9959-CD89F993E00D}"/>
+              </a:ext>
+            </a:extLst>
+          </p:cNvPr>
+          <p:cNvGrpSpPr/>
+          <p:nvPr/>
+        </p:nvGrpSpPr>
+        <p:grpSpPr>
+          <a:xfrm>
+            <a:off x="11353800" y="0"/>
+            <a:ext cx="914400" cy="914400"/>
+            <a:chOff x="9389351" y="1596423"/>
+            <a:chExt cx="914400" cy="914400"/>
+          </a:xfrm>
+        </p:grpSpPr>
+        <p:sp>
+          <p:nvSpPr>
+            <p:cNvPr id="27" name="Rectangle 26">
+              <a:extLst>
+                <a:ext uri="{FF2B5EF4-FFF2-40B4-BE49-F238E27FC236}">
+                  <a16:creationId xmlns:a16="http://schemas.microsoft.com/office/drawing/2014/main" id="{A9D40313-0618-4983-AAF5-417BAF5FBE98}"/>
+                </a:ext>
+              </a:extLst>
+            </p:cNvPr>
+            <p:cNvSpPr>
+              <a:spLocks/>
+            </p:cNvSpPr>
+            <p:nvPr/>
+          </p:nvSpPr>
+          <p:spPr>
+            <a:xfrm>
+              <a:off x="9486554" y="1660411"/>
+              <a:ext cx="720000" cy="792000"/>
+            </a:xfrm>
+            <a:prstGeom prst="rect">
+              <a:avLst/>
+            </a:prstGeom>
+            <a:solidFill>
+              <a:schemeClr val="bg1"/>
+            </a:solidFill>
+            <a:ln>
+              <a:solidFill>
+                <a:schemeClr val="bg1"/>
+              </a:solidFill>
+            </a:ln>
+          </p:spPr>
+          <p:style>
+            <a:lnRef idx="2">
+              <a:schemeClr val="accent1">
+                <a:shade val="50000"/>
+              </a:schemeClr>
+            </a:lnRef>
+            <a:fillRef idx="1">
+              <a:schemeClr val="accent1"/>
+            </a:fillRef>
+            <a:effectRef idx="0">
+              <a:schemeClr val="accent1"/>
+            </a:effectRef>
+            <a:fontRef idx="minor">
+              <a:schemeClr val="lt1"/>
+            </a:fontRef>
+          </p:style>
+          <p:txBody>
+            <a:bodyPr rtlCol="0" anchor="ctr"/>
+            <a:lstStyle/>
+            <a:p>
+              <a:pPr algn="ctr"/>
+              <a:endParaRPr lang="en-US"/>
+            </a:p>
+          </p:txBody>
+        </p:sp>
+        <p:pic>
+          <p:nvPicPr>
+            <p:cNvPr id="28" name="Graphic 27" descr="Questions">
+              <a:extLst>
+                <a:ext uri="{FF2B5EF4-FFF2-40B4-BE49-F238E27FC236}">
+                  <a16:creationId xmlns:a16="http://schemas.microsoft.com/office/drawing/2014/main" id="{10CCAF9E-8662-4B72-8CF1-C3B049CEC2FF}"/>
+                </a:ext>
+              </a:extLst>
+            </p:cNvPr>
+            <p:cNvPicPr>
+              <a:picLocks noChangeAspect="1"/>
+            </p:cNvPicPr>
+            <p:nvPr/>
+          </p:nvPicPr>
+          <p:blipFill>
+            <a:blip r:embed="rId3">
+              <a:extLst>
+                <a:ext uri="{28A0092B-C50C-407E-A947-70E740481C1C}">
+                  <a14:useLocalDpi xmlns:a14="http://schemas.microsoft.com/office/drawing/2010/main" val="0"/>
+                </a:ext>
+                <a:ext uri="{96DAC541-7B7A-43D3-8B79-37D633B846F1}">
+                  <asvg:svgBlip xmlns:asvg="http://schemas.microsoft.com/office/drawing/2016/SVG/main" r:embed="rId4"/>
+                </a:ext>
+              </a:extLst>
+            </a:blip>
+            <a:stretch>
+              <a:fillRect/>
+            </a:stretch>
+          </p:blipFill>
+          <p:spPr>
+            <a:xfrm>
+              <a:off x="9389351" y="1596423"/>
+              <a:ext cx="914400" cy="914400"/>
+            </a:xfrm>
+            <a:prstGeom prst="rect">
+              <a:avLst/>
+            </a:prstGeom>
+          </p:spPr>
+        </p:pic>
+      </p:grpSp>
+      <p:grpSp>
+        <p:nvGrpSpPr>
+          <p:cNvPr id="29" name="Group 28">
+            <a:extLst>
+              <a:ext uri="{FF2B5EF4-FFF2-40B4-BE49-F238E27FC236}">
+                <a16:creationId xmlns:a16="http://schemas.microsoft.com/office/drawing/2014/main" id="{1CEC6DEA-F4DA-4CA1-9AA7-AFCC9FC45940}"/>
+              </a:ext>
+            </a:extLst>
+          </p:cNvPr>
+          <p:cNvGrpSpPr/>
+          <p:nvPr/>
+        </p:nvGrpSpPr>
+        <p:grpSpPr>
+          <a:xfrm>
+            <a:off x="4065966" y="1538011"/>
+            <a:ext cx="914400" cy="914400"/>
+            <a:chOff x="4065966" y="1538011"/>
+            <a:chExt cx="914400" cy="914400"/>
+          </a:xfrm>
+        </p:grpSpPr>
+        <p:sp>
+          <p:nvSpPr>
+            <p:cNvPr id="11" name="Rectangle 10">
+              <a:extLst>
+                <a:ext uri="{FF2B5EF4-FFF2-40B4-BE49-F238E27FC236}">
+                  <a16:creationId xmlns:a16="http://schemas.microsoft.com/office/drawing/2014/main" id="{78A14CF9-C9E2-4411-999B-E2DDFC4F08FF}"/>
+                </a:ext>
+              </a:extLst>
+            </p:cNvPr>
+            <p:cNvSpPr/>
+            <p:nvPr/>
+          </p:nvSpPr>
+          <p:spPr>
+            <a:xfrm>
+              <a:off x="4098834" y="1615085"/>
+              <a:ext cx="846989" cy="745561"/>
+            </a:xfrm>
+            <a:prstGeom prst="rect">
+              <a:avLst/>
+            </a:prstGeom>
+            <a:solidFill>
+              <a:schemeClr val="bg1"/>
+            </a:solidFill>
+            <a:ln>
+              <a:noFill/>
+            </a:ln>
+          </p:spPr>
+          <p:style>
+            <a:lnRef idx="2">
+              <a:schemeClr val="accent1">
+                <a:shade val="50000"/>
+              </a:schemeClr>
+            </a:lnRef>
+            <a:fillRef idx="1">
+              <a:schemeClr val="accent1"/>
+            </a:fillRef>
+            <a:effectRef idx="0">
+              <a:schemeClr val="accent1"/>
+            </a:effectRef>
+            <a:fontRef idx="minor">
+              <a:schemeClr val="lt1"/>
+            </a:fontRef>
+          </p:style>
+          <p:txBody>
+            <a:bodyPr rtlCol="0" anchor="ctr"/>
+            <a:lstStyle/>
+            <a:p>
+              <a:pPr algn="ctr"/>
+              <a:endParaRPr lang="en-US"/>
+            </a:p>
+          </p:txBody>
+        </p:sp>
+        <p:pic>
+          <p:nvPicPr>
+            <p:cNvPr id="18" name="Graphic 17" descr="Clapper board">
+              <a:extLst>
+                <a:ext uri="{FF2B5EF4-FFF2-40B4-BE49-F238E27FC236}">
+                  <a16:creationId xmlns:a16="http://schemas.microsoft.com/office/drawing/2014/main" id="{96F2396B-1866-44C5-9C9D-ABC392CBC49A}"/>
+                </a:ext>
+              </a:extLst>
+            </p:cNvPr>
+            <p:cNvPicPr>
+              <a:picLocks noChangeAspect="1"/>
+            </p:cNvPicPr>
+            <p:nvPr/>
+          </p:nvPicPr>
+          <p:blipFill>
+            <a:blip r:embed="rId5">
+              <a:extLst>
+                <a:ext uri="{28A0092B-C50C-407E-A947-70E740481C1C}">
+                  <a14:useLocalDpi xmlns:a14="http://schemas.microsoft.com/office/drawing/2010/main" val="0"/>
+                </a:ext>
+                <a:ext uri="{96DAC541-7B7A-43D3-8B79-37D633B846F1}">
+                  <asvg:svgBlip xmlns:asvg="http://schemas.microsoft.com/office/drawing/2016/SVG/main" r:embed="rId6"/>
+                </a:ext>
+              </a:extLst>
+            </a:blip>
+            <a:stretch>
+              <a:fillRect/>
+            </a:stretch>
+          </p:blipFill>
+          <p:spPr>
+            <a:xfrm>
+              <a:off x="4065966" y="1538011"/>
+              <a:ext cx="914400" cy="914400"/>
+            </a:xfrm>
+            <a:prstGeom prst="rect">
+              <a:avLst/>
+            </a:prstGeom>
+          </p:spPr>
+        </p:pic>
+      </p:grpSp>
+      <p:grpSp>
+        <p:nvGrpSpPr>
+          <p:cNvPr id="30" name="Group 29">
+            <a:extLst>
+              <a:ext uri="{FF2B5EF4-FFF2-40B4-BE49-F238E27FC236}">
+                <a16:creationId xmlns:a16="http://schemas.microsoft.com/office/drawing/2014/main" id="{F1CBECC5-9938-41B6-9D61-11D4D50DEA1C}"/>
+              </a:ext>
+            </a:extLst>
+          </p:cNvPr>
+          <p:cNvGrpSpPr/>
+          <p:nvPr/>
+        </p:nvGrpSpPr>
+        <p:grpSpPr>
+          <a:xfrm>
+            <a:off x="11277600" y="6006012"/>
+            <a:ext cx="914400" cy="914400"/>
+            <a:chOff x="4065966" y="1538011"/>
+            <a:chExt cx="914400" cy="914400"/>
+          </a:xfrm>
+        </p:grpSpPr>
+        <p:sp>
+          <p:nvSpPr>
+            <p:cNvPr id="31" name="Rectangle 30">
+              <a:extLst>
+                <a:ext uri="{FF2B5EF4-FFF2-40B4-BE49-F238E27FC236}">
+                  <a16:creationId xmlns:a16="http://schemas.microsoft.com/office/drawing/2014/main" id="{6854274C-8E5B-434C-95FA-3F94BFB0343D}"/>
+                </a:ext>
+              </a:extLst>
+            </p:cNvPr>
+            <p:cNvSpPr/>
+            <p:nvPr/>
+          </p:nvSpPr>
+          <p:spPr>
+            <a:xfrm>
+              <a:off x="4098834" y="1615085"/>
+              <a:ext cx="846989" cy="745561"/>
+            </a:xfrm>
+            <a:prstGeom prst="rect">
+              <a:avLst/>
+            </a:prstGeom>
+            <a:solidFill>
+              <a:schemeClr val="bg1"/>
+            </a:solidFill>
+            <a:ln>
+              <a:noFill/>
+            </a:ln>
+          </p:spPr>
+          <p:style>
+            <a:lnRef idx="2">
+              <a:schemeClr val="accent1">
+                <a:shade val="50000"/>
+              </a:schemeClr>
+            </a:lnRef>
+            <a:fillRef idx="1">
+              <a:schemeClr val="accent1"/>
+            </a:fillRef>
+            <a:effectRef idx="0">
+              <a:schemeClr val="accent1"/>
+            </a:effectRef>
+            <a:fontRef idx="minor">
+              <a:schemeClr val="lt1"/>
+            </a:fontRef>
+          </p:style>
+          <p:txBody>
+            <a:bodyPr rtlCol="0" anchor="ctr"/>
+            <a:lstStyle/>
+            <a:p>
+              <a:pPr algn="ctr"/>
+              <a:endParaRPr lang="en-US"/>
+            </a:p>
+          </p:txBody>
+        </p:sp>
+        <p:pic>
+          <p:nvPicPr>
+            <p:cNvPr id="32" name="Graphic 31" descr="Clapper board">
+              <a:extLst>
+                <a:ext uri="{FF2B5EF4-FFF2-40B4-BE49-F238E27FC236}">
+                  <a16:creationId xmlns:a16="http://schemas.microsoft.com/office/drawing/2014/main" id="{898A6EEA-6E0A-4FF6-A038-379D8E2D67E2}"/>
+                </a:ext>
+              </a:extLst>
+            </p:cNvPr>
+            <p:cNvPicPr>
+              <a:picLocks noChangeAspect="1"/>
+            </p:cNvPicPr>
+            <p:nvPr/>
+          </p:nvPicPr>
+          <p:blipFill>
+            <a:blip r:embed="rId5">
+              <a:extLst>
+                <a:ext uri="{28A0092B-C50C-407E-A947-70E740481C1C}">
+                  <a14:useLocalDpi xmlns:a14="http://schemas.microsoft.com/office/drawing/2010/main" val="0"/>
+                </a:ext>
+                <a:ext uri="{96DAC541-7B7A-43D3-8B79-37D633B846F1}">
+                  <asvg:svgBlip xmlns:asvg="http://schemas.microsoft.com/office/drawing/2016/SVG/main" r:embed="rId6"/>
+                </a:ext>
+              </a:extLst>
+            </a:blip>
+            <a:stretch>
+              <a:fillRect/>
+            </a:stretch>
+          </p:blipFill>
+          <p:spPr>
+            <a:xfrm>
+              <a:off x="4065966" y="1538011"/>
+              <a:ext cx="914400" cy="914400"/>
+            </a:xfrm>
+            <a:prstGeom prst="rect">
+              <a:avLst/>
+            </a:prstGeom>
+          </p:spPr>
+        </p:pic>
+      </p:grpSp>
     </p:spTree>
     <p:extLst>
       <p:ext uri="{BB962C8B-B14F-4D97-AF65-F5344CB8AC3E}">
@@ -4344,522 +4798,6 @@
       <p:transition spd="slow" advTm="3182"/>
     </mc:Fallback>
   </mc:AlternateContent>
-  <p:timing>
-    <p:tnLst>
-      <p:par>
-        <p:cTn id="1" dur="indefinite" restart="never" nodeType="tmRoot">
-          <p:childTnLst>
-            <p:seq concurrent="1" nextAc="seek">
-              <p:cTn id="2" dur="indefinite" nodeType="mainSeq">
-                <p:childTnLst>
-                  <p:par>
-                    <p:cTn id="3" fill="hold">
-                      <p:stCondLst>
-                        <p:cond delay="indefinite"/>
-                      </p:stCondLst>
-                      <p:childTnLst>
-                        <p:par>
-                          <p:cTn id="4" fill="hold">
-                            <p:stCondLst>
-                              <p:cond delay="0"/>
-                            </p:stCondLst>
-                            <p:childTnLst>
-                              <p:par>
-                                <p:cTn id="5" presetID="1" presetClass="entr" presetSubtype="0" fill="hold" nodeType="clickEffect">
-                                  <p:stCondLst>
-                                    <p:cond delay="0"/>
-                                  </p:stCondLst>
-                                  <p:childTnLst>
-                                    <p:set>
-                                      <p:cBhvr>
-                                        <p:cTn id="6" dur="1" fill="hold">
-                                          <p:stCondLst>
-                                            <p:cond delay="0"/>
-                                          </p:stCondLst>
-                                        </p:cTn>
-                                        <p:tgtEl>
-                                          <p:spTgt spid="6"/>
-                                        </p:tgtEl>
-                                        <p:attrNameLst>
-                                          <p:attrName>style.visibility</p:attrName>
-                                        </p:attrNameLst>
-                                      </p:cBhvr>
-                                      <p:to>
-                                        <p:strVal val="visible"/>
-                                      </p:to>
-                                    </p:set>
-                                  </p:childTnLst>
-                                </p:cTn>
-                              </p:par>
-                            </p:childTnLst>
-                          </p:cTn>
-                        </p:par>
-                        <p:par>
-                          <p:cTn id="7" fill="hold">
-                            <p:stCondLst>
-                              <p:cond delay="0"/>
-                            </p:stCondLst>
-                            <p:childTnLst>
-                              <p:par>
-                                <p:cTn id="8" presetID="1" presetClass="exit" presetSubtype="0" fill="hold" nodeType="afterEffect">
-                                  <p:stCondLst>
-                                    <p:cond delay="200"/>
-                                  </p:stCondLst>
-                                  <p:childTnLst>
-                                    <p:set>
-                                      <p:cBhvr>
-                                        <p:cTn id="9" dur="1" fill="hold">
-                                          <p:stCondLst>
-                                            <p:cond delay="0"/>
-                                          </p:stCondLst>
-                                        </p:cTn>
-                                        <p:tgtEl>
-                                          <p:spTgt spid="6"/>
-                                        </p:tgtEl>
-                                        <p:attrNameLst>
-                                          <p:attrName>style.visibility</p:attrName>
-                                        </p:attrNameLst>
-                                      </p:cBhvr>
-                                      <p:to>
-                                        <p:strVal val="hidden"/>
-                                      </p:to>
-                                    </p:set>
-                                  </p:childTnLst>
-                                </p:cTn>
-                              </p:par>
-                            </p:childTnLst>
-                          </p:cTn>
-                        </p:par>
-                      </p:childTnLst>
-                    </p:cTn>
-                  </p:par>
-                  <p:par>
-                    <p:cTn id="10" fill="hold">
-                      <p:stCondLst>
-                        <p:cond delay="indefinite"/>
-                      </p:stCondLst>
-                      <p:childTnLst>
-                        <p:par>
-                          <p:cTn id="11" fill="hold">
-                            <p:stCondLst>
-                              <p:cond delay="0"/>
-                            </p:stCondLst>
-                            <p:childTnLst>
-                              <p:par>
-                                <p:cTn id="12" presetID="1" presetClass="entr" presetSubtype="0" fill="hold" nodeType="clickEffect">
-                                  <p:stCondLst>
-                                    <p:cond delay="0"/>
-                                  </p:stCondLst>
-                                  <p:childTnLst>
-                                    <p:set>
-                                      <p:cBhvr>
-                                        <p:cTn id="13" dur="1" fill="hold">
-                                          <p:stCondLst>
-                                            <p:cond delay="0"/>
-                                          </p:stCondLst>
-                                        </p:cTn>
-                                        <p:tgtEl>
-                                          <p:spTgt spid="7"/>
-                                        </p:tgtEl>
-                                        <p:attrNameLst>
-                                          <p:attrName>style.visibility</p:attrName>
-                                        </p:attrNameLst>
-                                      </p:cBhvr>
-                                      <p:to>
-                                        <p:strVal val="visible"/>
-                                      </p:to>
-                                    </p:set>
-                                  </p:childTnLst>
-                                </p:cTn>
-                              </p:par>
-                            </p:childTnLst>
-                          </p:cTn>
-                        </p:par>
-                        <p:par>
-                          <p:cTn id="14" fill="hold">
-                            <p:stCondLst>
-                              <p:cond delay="0"/>
-                            </p:stCondLst>
-                            <p:childTnLst>
-                              <p:par>
-                                <p:cTn id="15" presetID="1" presetClass="exit" presetSubtype="0" fill="hold" nodeType="afterEffect">
-                                  <p:stCondLst>
-                                    <p:cond delay="500"/>
-                                  </p:stCondLst>
-                                  <p:childTnLst>
-                                    <p:set>
-                                      <p:cBhvr>
-                                        <p:cTn id="16" dur="1" fill="hold">
-                                          <p:stCondLst>
-                                            <p:cond delay="0"/>
-                                          </p:stCondLst>
-                                        </p:cTn>
-                                        <p:tgtEl>
-                                          <p:spTgt spid="7"/>
-                                        </p:tgtEl>
-                                        <p:attrNameLst>
-                                          <p:attrName>style.visibility</p:attrName>
-                                        </p:attrNameLst>
-                                      </p:cBhvr>
-                                      <p:to>
-                                        <p:strVal val="hidden"/>
-                                      </p:to>
-                                    </p:set>
-                                  </p:childTnLst>
-                                </p:cTn>
-                              </p:par>
-                            </p:childTnLst>
-                          </p:cTn>
-                        </p:par>
-                      </p:childTnLst>
-                    </p:cTn>
-                  </p:par>
-                  <p:par>
-                    <p:cTn id="17" fill="hold">
-                      <p:stCondLst>
-                        <p:cond delay="indefinite"/>
-                      </p:stCondLst>
-                      <p:childTnLst>
-                        <p:par>
-                          <p:cTn id="18" fill="hold">
-                            <p:stCondLst>
-                              <p:cond delay="0"/>
-                            </p:stCondLst>
-                            <p:childTnLst>
-                              <p:par>
-                                <p:cTn id="19" presetID="1" presetClass="entr" presetSubtype="0" fill="hold" nodeType="clickEffect">
-                                  <p:stCondLst>
-                                    <p:cond delay="0"/>
-                                  </p:stCondLst>
-                                  <p:childTnLst>
-                                    <p:set>
-                                      <p:cBhvr>
-                                        <p:cTn id="20" dur="1" fill="hold">
-                                          <p:stCondLst>
-                                            <p:cond delay="0"/>
-                                          </p:stCondLst>
-                                        </p:cTn>
-                                        <p:tgtEl>
-                                          <p:spTgt spid="12"/>
-                                        </p:tgtEl>
-                                        <p:attrNameLst>
-                                          <p:attrName>style.visibility</p:attrName>
-                                        </p:attrNameLst>
-                                      </p:cBhvr>
-                                      <p:to>
-                                        <p:strVal val="visible"/>
-                                      </p:to>
-                                    </p:set>
-                                  </p:childTnLst>
-                                </p:cTn>
-                              </p:par>
-                            </p:childTnLst>
-                          </p:cTn>
-                        </p:par>
-                        <p:par>
-                          <p:cTn id="21" fill="hold">
-                            <p:stCondLst>
-                              <p:cond delay="0"/>
-                            </p:stCondLst>
-                            <p:childTnLst>
-                              <p:par>
-                                <p:cTn id="22" presetID="1" presetClass="exit" presetSubtype="0" fill="hold" nodeType="afterEffect">
-                                  <p:stCondLst>
-                                    <p:cond delay="200"/>
-                                  </p:stCondLst>
-                                  <p:childTnLst>
-                                    <p:set>
-                                      <p:cBhvr>
-                                        <p:cTn id="23" dur="1" fill="hold">
-                                          <p:stCondLst>
-                                            <p:cond delay="0"/>
-                                          </p:stCondLst>
-                                        </p:cTn>
-                                        <p:tgtEl>
-                                          <p:spTgt spid="12"/>
-                                        </p:tgtEl>
-                                        <p:attrNameLst>
-                                          <p:attrName>style.visibility</p:attrName>
-                                        </p:attrNameLst>
-                                      </p:cBhvr>
-                                      <p:to>
-                                        <p:strVal val="hidden"/>
-                                      </p:to>
-                                    </p:set>
-                                  </p:childTnLst>
-                                </p:cTn>
-                              </p:par>
-                            </p:childTnLst>
-                          </p:cTn>
-                        </p:par>
-                      </p:childTnLst>
-                    </p:cTn>
-                  </p:par>
-                  <p:par>
-                    <p:cTn id="24" fill="hold">
-                      <p:stCondLst>
-                        <p:cond delay="indefinite"/>
-                      </p:stCondLst>
-                      <p:childTnLst>
-                        <p:par>
-                          <p:cTn id="25" fill="hold">
-                            <p:stCondLst>
-                              <p:cond delay="0"/>
-                            </p:stCondLst>
-                            <p:childTnLst>
-                              <p:par>
-                                <p:cTn id="26" presetID="1" presetClass="entr" presetSubtype="0" fill="hold" nodeType="clickEffect">
-                                  <p:stCondLst>
-                                    <p:cond delay="0"/>
-                                  </p:stCondLst>
-                                  <p:childTnLst>
-                                    <p:set>
-                                      <p:cBhvr>
-                                        <p:cTn id="27" dur="1" fill="hold">
-                                          <p:stCondLst>
-                                            <p:cond delay="0"/>
-                                          </p:stCondLst>
-                                        </p:cTn>
-                                        <p:tgtEl>
-                                          <p:spTgt spid="13"/>
-                                        </p:tgtEl>
-                                        <p:attrNameLst>
-                                          <p:attrName>style.visibility</p:attrName>
-                                        </p:attrNameLst>
-                                      </p:cBhvr>
-                                      <p:to>
-                                        <p:strVal val="visible"/>
-                                      </p:to>
-                                    </p:set>
-                                  </p:childTnLst>
-                                </p:cTn>
-                              </p:par>
-                            </p:childTnLst>
-                          </p:cTn>
-                        </p:par>
-                        <p:par>
-                          <p:cTn id="28" fill="hold">
-                            <p:stCondLst>
-                              <p:cond delay="0"/>
-                            </p:stCondLst>
-                            <p:childTnLst>
-                              <p:par>
-                                <p:cTn id="29" presetID="1" presetClass="exit" presetSubtype="0" fill="hold" nodeType="afterEffect">
-                                  <p:stCondLst>
-                                    <p:cond delay="200"/>
-                                  </p:stCondLst>
-                                  <p:childTnLst>
-                                    <p:set>
-                                      <p:cBhvr>
-                                        <p:cTn id="30" dur="1" fill="hold">
-                                          <p:stCondLst>
-                                            <p:cond delay="0"/>
-                                          </p:stCondLst>
-                                        </p:cTn>
-                                        <p:tgtEl>
-                                          <p:spTgt spid="13"/>
-                                        </p:tgtEl>
-                                        <p:attrNameLst>
-                                          <p:attrName>style.visibility</p:attrName>
-                                        </p:attrNameLst>
-                                      </p:cBhvr>
-                                      <p:to>
-                                        <p:strVal val="hidden"/>
-                                      </p:to>
-                                    </p:set>
-                                  </p:childTnLst>
-                                </p:cTn>
-                              </p:par>
-                            </p:childTnLst>
-                          </p:cTn>
-                        </p:par>
-                      </p:childTnLst>
-                    </p:cTn>
-                  </p:par>
-                  <p:par>
-                    <p:cTn id="31" fill="hold">
-                      <p:stCondLst>
-                        <p:cond delay="indefinite"/>
-                      </p:stCondLst>
-                      <p:childTnLst>
-                        <p:par>
-                          <p:cTn id="32" fill="hold">
-                            <p:stCondLst>
-                              <p:cond delay="0"/>
-                            </p:stCondLst>
-                            <p:childTnLst>
-                              <p:par>
-                                <p:cTn id="33" presetID="1" presetClass="entr" presetSubtype="0" fill="hold" nodeType="clickEffect">
-                                  <p:stCondLst>
-                                    <p:cond delay="0"/>
-                                  </p:stCondLst>
-                                  <p:childTnLst>
-                                    <p:set>
-                                      <p:cBhvr>
-                                        <p:cTn id="34" dur="1" fill="hold">
-                                          <p:stCondLst>
-                                            <p:cond delay="0"/>
-                                          </p:stCondLst>
-                                        </p:cTn>
-                                        <p:tgtEl>
-                                          <p:spTgt spid="14"/>
-                                        </p:tgtEl>
-                                        <p:attrNameLst>
-                                          <p:attrName>style.visibility</p:attrName>
-                                        </p:attrNameLst>
-                                      </p:cBhvr>
-                                      <p:to>
-                                        <p:strVal val="visible"/>
-                                      </p:to>
-                                    </p:set>
-                                  </p:childTnLst>
-                                </p:cTn>
-                              </p:par>
-                            </p:childTnLst>
-                          </p:cTn>
-                        </p:par>
-                        <p:par>
-                          <p:cTn id="35" fill="hold">
-                            <p:stCondLst>
-                              <p:cond delay="0"/>
-                            </p:stCondLst>
-                            <p:childTnLst>
-                              <p:par>
-                                <p:cTn id="36" presetID="1" presetClass="exit" presetSubtype="0" fill="hold" nodeType="afterEffect">
-                                  <p:stCondLst>
-                                    <p:cond delay="200"/>
-                                  </p:stCondLst>
-                                  <p:childTnLst>
-                                    <p:set>
-                                      <p:cBhvr>
-                                        <p:cTn id="37" dur="1" fill="hold">
-                                          <p:stCondLst>
-                                            <p:cond delay="0"/>
-                                          </p:stCondLst>
-                                        </p:cTn>
-                                        <p:tgtEl>
-                                          <p:spTgt spid="14"/>
-                                        </p:tgtEl>
-                                        <p:attrNameLst>
-                                          <p:attrName>style.visibility</p:attrName>
-                                        </p:attrNameLst>
-                                      </p:cBhvr>
-                                      <p:to>
-                                        <p:strVal val="hidden"/>
-                                      </p:to>
-                                    </p:set>
-                                  </p:childTnLst>
-                                </p:cTn>
-                              </p:par>
-                            </p:childTnLst>
-                          </p:cTn>
-                        </p:par>
-                      </p:childTnLst>
-                    </p:cTn>
-                  </p:par>
-                  <p:par>
-                    <p:cTn id="38" fill="hold">
-                      <p:stCondLst>
-                        <p:cond delay="indefinite"/>
-                      </p:stCondLst>
-                      <p:childTnLst>
-                        <p:par>
-                          <p:cTn id="39" fill="hold">
-                            <p:stCondLst>
-                              <p:cond delay="0"/>
-                            </p:stCondLst>
-                            <p:childTnLst>
-                              <p:par>
-                                <p:cTn id="40" presetID="1" presetClass="entr" presetSubtype="0" fill="hold" nodeType="clickEffect">
-                                  <p:stCondLst>
-                                    <p:cond delay="0"/>
-                                  </p:stCondLst>
-                                  <p:childTnLst>
-                                    <p:set>
-                                      <p:cBhvr>
-                                        <p:cTn id="41" dur="1" fill="hold">
-                                          <p:stCondLst>
-                                            <p:cond delay="0"/>
-                                          </p:stCondLst>
-                                        </p:cTn>
-                                        <p:tgtEl>
-                                          <p:spTgt spid="18"/>
-                                        </p:tgtEl>
-                                        <p:attrNameLst>
-                                          <p:attrName>style.visibility</p:attrName>
-                                        </p:attrNameLst>
-                                      </p:cBhvr>
-                                      <p:to>
-                                        <p:strVal val="visible"/>
-                                      </p:to>
-                                    </p:set>
-                                  </p:childTnLst>
-                                </p:cTn>
-                              </p:par>
-                            </p:childTnLst>
-                          </p:cTn>
-                        </p:par>
-                        <p:par>
-                          <p:cTn id="42" fill="hold">
-                            <p:stCondLst>
-                              <p:cond delay="0"/>
-                            </p:stCondLst>
-                            <p:childTnLst>
-                              <p:par>
-                                <p:cTn id="43" presetID="1" presetClass="exit" presetSubtype="0" fill="hold" nodeType="afterEffect">
-                                  <p:stCondLst>
-                                    <p:cond delay="500"/>
-                                  </p:stCondLst>
-                                  <p:childTnLst>
-                                    <p:set>
-                                      <p:cBhvr>
-                                        <p:cTn id="44" dur="1" fill="hold">
-                                          <p:stCondLst>
-                                            <p:cond delay="0"/>
-                                          </p:stCondLst>
-                                        </p:cTn>
-                                        <p:tgtEl>
-                                          <p:spTgt spid="18"/>
-                                        </p:tgtEl>
-                                        <p:attrNameLst>
-                                          <p:attrName>style.visibility</p:attrName>
-                                        </p:attrNameLst>
-                                      </p:cBhvr>
-                                      <p:to>
-                                        <p:strVal val="hidden"/>
-                                      </p:to>
-                                    </p:set>
-                                  </p:childTnLst>
-                                </p:cTn>
-                              </p:par>
-                            </p:childTnLst>
-                          </p:cTn>
-                        </p:par>
-                      </p:childTnLst>
-                    </p:cTn>
-                  </p:par>
-                </p:childTnLst>
-              </p:cTn>
-              <p:prevCondLst>
-                <p:cond evt="onPrev" delay="0">
-                  <p:tgtEl>
-                    <p:sldTgt/>
-                  </p:tgtEl>
-                </p:cond>
-              </p:prevCondLst>
-              <p:nextCondLst>
-                <p:cond evt="onNext" delay="0">
-                  <p:tgtEl>
-                    <p:sldTgt/>
-                  </p:tgtEl>
-                </p:cond>
-              </p:nextCondLst>
-            </p:seq>
-          </p:childTnLst>
-        </p:cTn>
-      </p:par>
-    </p:tnLst>
-  </p:timing>
 </p:sld>
 </file>
 

</xml_diff>